<commit_message>
:hammer: JPA와 JDBC 자료 수정
</commit_message>
<xml_diff>
--- a/Ten-min-Seminar/20.04.25 JPA와 JDBC/JPA와JDBC.pptx
+++ b/Ten-min-Seminar/20.04.25 JPA와 JDBC/JPA와JDBC.pptx
@@ -150,6 +150,11 @@
       </a:defRPr>
     </a:lvl9pPr>
   </p:defaultTextStyle>
+  <p:extLst>
+    <p:ext uri="{EFAFB233-063F-42B5-8137-9DF3F51BA10A}">
+      <p15:sldGuideLst xmlns:p15="http://schemas.microsoft.com/office/powerpoint/2012/main"/>
+    </p:ext>
+  </p:extLst>
 </p:presentation>
 </file>
 
@@ -284,7 +289,7 @@
           <a:p>
             <a:fld id="{974660E2-A8B9-44CC-9E7C-52ADA9560240}" type="datetimeFigureOut">
               <a:rPr lang="ko-KR" altLang="en-US" smtClean="0"/>
-              <a:t>2020-04-25</a:t>
+              <a:t>2020-04-27</a:t>
             </a:fld>
             <a:endParaRPr lang="ko-KR" altLang="en-US"/>
           </a:p>
@@ -454,7 +459,7 @@
           <a:p>
             <a:fld id="{974660E2-A8B9-44CC-9E7C-52ADA9560240}" type="datetimeFigureOut">
               <a:rPr lang="ko-KR" altLang="en-US" smtClean="0"/>
-              <a:t>2020-04-25</a:t>
+              <a:t>2020-04-27</a:t>
             </a:fld>
             <a:endParaRPr lang="ko-KR" altLang="en-US"/>
           </a:p>
@@ -634,7 +639,7 @@
           <a:p>
             <a:fld id="{974660E2-A8B9-44CC-9E7C-52ADA9560240}" type="datetimeFigureOut">
               <a:rPr lang="ko-KR" altLang="en-US" smtClean="0"/>
-              <a:t>2020-04-25</a:t>
+              <a:t>2020-04-27</a:t>
             </a:fld>
             <a:endParaRPr lang="ko-KR" altLang="en-US"/>
           </a:p>
@@ -804,7 +809,7 @@
           <a:p>
             <a:fld id="{974660E2-A8B9-44CC-9E7C-52ADA9560240}" type="datetimeFigureOut">
               <a:rPr lang="ko-KR" altLang="en-US" smtClean="0"/>
-              <a:t>2020-04-25</a:t>
+              <a:t>2020-04-27</a:t>
             </a:fld>
             <a:endParaRPr lang="ko-KR" altLang="en-US"/>
           </a:p>
@@ -1050,7 +1055,7 @@
           <a:p>
             <a:fld id="{974660E2-A8B9-44CC-9E7C-52ADA9560240}" type="datetimeFigureOut">
               <a:rPr lang="ko-KR" altLang="en-US" smtClean="0"/>
-              <a:t>2020-04-25</a:t>
+              <a:t>2020-04-27</a:t>
             </a:fld>
             <a:endParaRPr lang="ko-KR" altLang="en-US"/>
           </a:p>
@@ -1282,7 +1287,7 @@
           <a:p>
             <a:fld id="{974660E2-A8B9-44CC-9E7C-52ADA9560240}" type="datetimeFigureOut">
               <a:rPr lang="ko-KR" altLang="en-US" smtClean="0"/>
-              <a:t>2020-04-25</a:t>
+              <a:t>2020-04-27</a:t>
             </a:fld>
             <a:endParaRPr lang="ko-KR" altLang="en-US"/>
           </a:p>
@@ -1649,7 +1654,7 @@
           <a:p>
             <a:fld id="{974660E2-A8B9-44CC-9E7C-52ADA9560240}" type="datetimeFigureOut">
               <a:rPr lang="ko-KR" altLang="en-US" smtClean="0"/>
-              <a:t>2020-04-25</a:t>
+              <a:t>2020-04-27</a:t>
             </a:fld>
             <a:endParaRPr lang="ko-KR" altLang="en-US"/>
           </a:p>
@@ -1767,7 +1772,7 @@
           <a:p>
             <a:fld id="{974660E2-A8B9-44CC-9E7C-52ADA9560240}" type="datetimeFigureOut">
               <a:rPr lang="ko-KR" altLang="en-US" smtClean="0"/>
-              <a:t>2020-04-25</a:t>
+              <a:t>2020-04-27</a:t>
             </a:fld>
             <a:endParaRPr lang="ko-KR" altLang="en-US"/>
           </a:p>
@@ -1862,7 +1867,7 @@
           <a:p>
             <a:fld id="{974660E2-A8B9-44CC-9E7C-52ADA9560240}" type="datetimeFigureOut">
               <a:rPr lang="ko-KR" altLang="en-US" smtClean="0"/>
-              <a:t>2020-04-25</a:t>
+              <a:t>2020-04-27</a:t>
             </a:fld>
             <a:endParaRPr lang="ko-KR" altLang="en-US"/>
           </a:p>
@@ -2139,7 +2144,7 @@
           <a:p>
             <a:fld id="{974660E2-A8B9-44CC-9E7C-52ADA9560240}" type="datetimeFigureOut">
               <a:rPr lang="ko-KR" altLang="en-US" smtClean="0"/>
-              <a:t>2020-04-25</a:t>
+              <a:t>2020-04-27</a:t>
             </a:fld>
             <a:endParaRPr lang="ko-KR" altLang="en-US"/>
           </a:p>
@@ -2392,7 +2397,7 @@
           <a:p>
             <a:fld id="{974660E2-A8B9-44CC-9E7C-52ADA9560240}" type="datetimeFigureOut">
               <a:rPr lang="ko-KR" altLang="en-US" smtClean="0"/>
-              <a:t>2020-04-25</a:t>
+              <a:t>2020-04-27</a:t>
             </a:fld>
             <a:endParaRPr lang="ko-KR" altLang="en-US"/>
           </a:p>
@@ -2605,7 +2610,7 @@
           <a:p>
             <a:fld id="{974660E2-A8B9-44CC-9E7C-52ADA9560240}" type="datetimeFigureOut">
               <a:rPr lang="ko-KR" altLang="en-US" smtClean="0"/>
-              <a:t>2020-04-25</a:t>
+              <a:t>2020-04-27</a:t>
             </a:fld>
             <a:endParaRPr lang="ko-KR" altLang="en-US"/>
           </a:p>
@@ -3443,8 +3448,8 @@
         </p:nvSpPr>
         <p:spPr>
           <a:xfrm>
-            <a:off x="4575155" y="2812495"/>
-            <a:ext cx="3041730" cy="2308324"/>
+            <a:off x="4718881" y="2812495"/>
+            <a:ext cx="2754279" cy="1569660"/>
           </a:xfrm>
           <a:prstGeom prst="rect">
             <a:avLst/>
@@ -3479,14 +3484,14 @@
           <a:p>
             <a:pPr algn="ctr"/>
             <a:r>
-              <a:rPr lang="en-US" altLang="ko-KR" sz="4800" dirty="0" err="1" smtClean="0">
-                <a:solidFill>
-                  <a:srgbClr val="4F42E6"/>
-                </a:solidFill>
-                <a:latin typeface="배달의민족 한나체 Pro" panose="020B0600000101010101" pitchFamily="50" charset="-127"/>
-                <a:ea typeface="배달의민족 한나체 Pro" panose="020B0600000101010101" pitchFamily="50" charset="-127"/>
-              </a:rPr>
-              <a:t>QueryDSL</a:t>
+              <a:rPr lang="ko-KR" altLang="en-US" sz="4800" dirty="0" err="1" smtClean="0">
+                <a:solidFill>
+                  <a:srgbClr val="4F42E6"/>
+                </a:solidFill>
+                <a:latin typeface="배달의민족 한나체 Pro" panose="020B0600000101010101" pitchFamily="50" charset="-127"/>
+                <a:ea typeface="배달의민족 한나체 Pro" panose="020B0600000101010101" pitchFamily="50" charset="-127"/>
+              </a:rPr>
+              <a:t>아이바티스</a:t>
             </a:r>
             <a:endParaRPr lang="en-US" altLang="ko-KR" sz="4800" dirty="0" smtClean="0">
               <a:solidFill>
@@ -3495,19 +3500,6 @@
               <a:latin typeface="배달의민족 한나체 Pro" panose="020B0600000101010101" pitchFamily="50" charset="-127"/>
               <a:ea typeface="배달의민족 한나체 Pro" panose="020B0600000101010101" pitchFamily="50" charset="-127"/>
             </a:endParaRPr>
-          </a:p>
-          <a:p>
-            <a:pPr algn="ctr"/>
-            <a:r>
-              <a:rPr lang="en-US" altLang="ko-KR" sz="4800" dirty="0" smtClean="0">
-                <a:solidFill>
-                  <a:srgbClr val="4F42E6"/>
-                </a:solidFill>
-                <a:latin typeface="배달의민족 한나체 Pro" panose="020B0600000101010101" pitchFamily="50" charset="-127"/>
-                <a:ea typeface="배달의민족 한나체 Pro" panose="020B0600000101010101" pitchFamily="50" charset="-127"/>
-              </a:rPr>
-              <a:t>JOOQ</a:t>
-            </a:r>
           </a:p>
         </p:txBody>
       </p:sp>
@@ -3689,15 +3681,15 @@
         </p:nvSpPr>
         <p:spPr>
           <a:xfrm>
-            <a:off x="234461" y="214930"/>
-            <a:ext cx="6096000" cy="6463308"/>
+            <a:off x="3793303" y="197346"/>
+            <a:ext cx="4605394" cy="6463308"/>
           </a:xfrm>
           <a:prstGeom prst="rect">
             <a:avLst/>
           </a:prstGeom>
         </p:spPr>
         <p:txBody>
-          <a:bodyPr>
+          <a:bodyPr wrap="square">
             <a:spAutoFit/>
           </a:bodyPr>
           <a:lstStyle/>
@@ -4062,385 +4054,6 @@
             <a:r>
               <a:rPr lang="ko-KR" altLang="en-US" dirty="0" smtClean="0"/>
               <a:t>="20"&gt;</a:t>
-            </a:r>
-            <a:endParaRPr lang="ko-KR" altLang="en-US" dirty="0"/>
-          </a:p>
-        </p:txBody>
-      </p:sp>
-      <p:sp>
-        <p:nvSpPr>
-          <p:cNvPr id="5" name="직사각형 4"/>
-          <p:cNvSpPr/>
-          <p:nvPr/>
-        </p:nvSpPr>
-        <p:spPr>
-          <a:xfrm>
-            <a:off x="5439507" y="492260"/>
-            <a:ext cx="6096000" cy="1754326"/>
-          </a:xfrm>
-          <a:prstGeom prst="rect">
-            <a:avLst/>
-          </a:prstGeom>
-        </p:spPr>
-        <p:txBody>
-          <a:bodyPr>
-            <a:spAutoFit/>
-          </a:bodyPr>
-          <a:lstStyle/>
-          <a:p>
-            <a:r>
-              <a:rPr lang="ko-KR" altLang="en-US" dirty="0" err="1" smtClean="0">
-                <a:latin typeface="나눔고딕코딩" panose="020D0009000000000000" pitchFamily="49" charset="-127"/>
-                <a:ea typeface="나눔고딕코딩" panose="020D0009000000000000" pitchFamily="49" charset="-127"/>
-              </a:rPr>
-              <a:t>List</a:t>
-            </a:r>
-            <a:r>
-              <a:rPr lang="ko-KR" altLang="en-US" dirty="0" smtClean="0">
-                <a:latin typeface="나눔고딕코딩" panose="020D0009000000000000" pitchFamily="49" charset="-127"/>
-                <a:ea typeface="나눔고딕코딩" panose="020D0009000000000000" pitchFamily="49" charset="-127"/>
-              </a:rPr>
-              <a:t>&lt;</a:t>
-            </a:r>
-            <a:r>
-              <a:rPr lang="ko-KR" altLang="en-US" dirty="0" err="1" smtClean="0">
-                <a:latin typeface="나눔고딕코딩" panose="020D0009000000000000" pitchFamily="49" charset="-127"/>
-                <a:ea typeface="나눔고딕코딩" panose="020D0009000000000000" pitchFamily="49" charset="-127"/>
-              </a:rPr>
-              <a:t>Person</a:t>
-            </a:r>
-            <a:r>
-              <a:rPr lang="ko-KR" altLang="en-US" dirty="0" smtClean="0">
-                <a:latin typeface="나눔고딕코딩" panose="020D0009000000000000" pitchFamily="49" charset="-127"/>
-                <a:ea typeface="나눔고딕코딩" panose="020D0009000000000000" pitchFamily="49" charset="-127"/>
-              </a:rPr>
-              <a:t>&gt; </a:t>
-            </a:r>
-            <a:r>
-              <a:rPr lang="ko-KR" altLang="en-US" dirty="0" err="1" smtClean="0">
-                <a:latin typeface="나눔고딕코딩" panose="020D0009000000000000" pitchFamily="49" charset="-127"/>
-                <a:ea typeface="나눔고딕코딩" panose="020D0009000000000000" pitchFamily="49" charset="-127"/>
-              </a:rPr>
-              <a:t>persons</a:t>
-            </a:r>
-            <a:r>
-              <a:rPr lang="ko-KR" altLang="en-US" dirty="0" smtClean="0">
-                <a:latin typeface="나눔고딕코딩" panose="020D0009000000000000" pitchFamily="49" charset="-127"/>
-                <a:ea typeface="나눔고딕코딩" panose="020D0009000000000000" pitchFamily="49" charset="-127"/>
-              </a:rPr>
-              <a:t> = </a:t>
-            </a:r>
-            <a:r>
-              <a:rPr lang="ko-KR" altLang="en-US" dirty="0" err="1" smtClean="0">
-                <a:latin typeface="나눔고딕코딩" panose="020D0009000000000000" pitchFamily="49" charset="-127"/>
-                <a:ea typeface="나눔고딕코딩" panose="020D0009000000000000" pitchFamily="49" charset="-127"/>
-              </a:rPr>
-              <a:t>queryFactory.selectFrom</a:t>
-            </a:r>
-            <a:r>
-              <a:rPr lang="ko-KR" altLang="en-US" dirty="0" smtClean="0">
-                <a:latin typeface="나눔고딕코딩" panose="020D0009000000000000" pitchFamily="49" charset="-127"/>
-                <a:ea typeface="나눔고딕코딩" panose="020D0009000000000000" pitchFamily="49" charset="-127"/>
-              </a:rPr>
-              <a:t>(</a:t>
-            </a:r>
-            <a:r>
-              <a:rPr lang="ko-KR" altLang="en-US" dirty="0" err="1" smtClean="0">
-                <a:latin typeface="나눔고딕코딩" panose="020D0009000000000000" pitchFamily="49" charset="-127"/>
-                <a:ea typeface="나눔고딕코딩" panose="020D0009000000000000" pitchFamily="49" charset="-127"/>
-              </a:rPr>
-              <a:t>person</a:t>
-            </a:r>
-            <a:r>
-              <a:rPr lang="ko-KR" altLang="en-US" dirty="0" smtClean="0">
-                <a:latin typeface="나눔고딕코딩" panose="020D0009000000000000" pitchFamily="49" charset="-127"/>
-                <a:ea typeface="나눔고딕코딩" panose="020D0009000000000000" pitchFamily="49" charset="-127"/>
-              </a:rPr>
-              <a:t>)</a:t>
-            </a:r>
-          </a:p>
-          <a:p>
-            <a:r>
-              <a:rPr lang="ko-KR" altLang="en-US" dirty="0" smtClean="0">
-                <a:latin typeface="나눔고딕코딩" panose="020D0009000000000000" pitchFamily="49" charset="-127"/>
-                <a:ea typeface="나눔고딕코딩" panose="020D0009000000000000" pitchFamily="49" charset="-127"/>
-              </a:rPr>
-              <a:t>  .</a:t>
-            </a:r>
-            <a:r>
-              <a:rPr lang="ko-KR" altLang="en-US" dirty="0" err="1" smtClean="0">
-                <a:latin typeface="나눔고딕코딩" panose="020D0009000000000000" pitchFamily="49" charset="-127"/>
-                <a:ea typeface="나눔고딕코딩" panose="020D0009000000000000" pitchFamily="49" charset="-127"/>
-              </a:rPr>
-              <a:t>where</a:t>
-            </a:r>
-            <a:r>
-              <a:rPr lang="ko-KR" altLang="en-US" dirty="0" smtClean="0">
-                <a:latin typeface="나눔고딕코딩" panose="020D0009000000000000" pitchFamily="49" charset="-127"/>
-                <a:ea typeface="나눔고딕코딩" panose="020D0009000000000000" pitchFamily="49" charset="-127"/>
-              </a:rPr>
-              <a:t>(</a:t>
-            </a:r>
-          </a:p>
-          <a:p>
-            <a:r>
-              <a:rPr lang="ko-KR" altLang="en-US" dirty="0" smtClean="0">
-                <a:latin typeface="나눔고딕코딩" panose="020D0009000000000000" pitchFamily="49" charset="-127"/>
-                <a:ea typeface="나눔고딕코딩" panose="020D0009000000000000" pitchFamily="49" charset="-127"/>
-              </a:rPr>
-              <a:t>    </a:t>
-            </a:r>
-            <a:r>
-              <a:rPr lang="ko-KR" altLang="en-US" dirty="0" err="1" smtClean="0">
-                <a:latin typeface="나눔고딕코딩" panose="020D0009000000000000" pitchFamily="49" charset="-127"/>
-                <a:ea typeface="나눔고딕코딩" panose="020D0009000000000000" pitchFamily="49" charset="-127"/>
-              </a:rPr>
-              <a:t>person.firstName.eq</a:t>
-            </a:r>
-            <a:r>
-              <a:rPr lang="ko-KR" altLang="en-US" dirty="0" smtClean="0">
-                <a:latin typeface="나눔고딕코딩" panose="020D0009000000000000" pitchFamily="49" charset="-127"/>
-                <a:ea typeface="나눔고딕코딩" panose="020D0009000000000000" pitchFamily="49" charset="-127"/>
-              </a:rPr>
-              <a:t>("</a:t>
-            </a:r>
-            <a:r>
-              <a:rPr lang="ko-KR" altLang="en-US" dirty="0" err="1" smtClean="0">
-                <a:latin typeface="나눔고딕코딩" panose="020D0009000000000000" pitchFamily="49" charset="-127"/>
-                <a:ea typeface="나눔고딕코딩" panose="020D0009000000000000" pitchFamily="49" charset="-127"/>
-              </a:rPr>
-              <a:t>John</a:t>
-            </a:r>
-            <a:r>
-              <a:rPr lang="ko-KR" altLang="en-US" dirty="0" smtClean="0">
-                <a:latin typeface="나눔고딕코딩" panose="020D0009000000000000" pitchFamily="49" charset="-127"/>
-                <a:ea typeface="나눔고딕코딩" panose="020D0009000000000000" pitchFamily="49" charset="-127"/>
-              </a:rPr>
-              <a:t>"),</a:t>
-            </a:r>
-          </a:p>
-          <a:p>
-            <a:r>
-              <a:rPr lang="ko-KR" altLang="en-US" dirty="0" smtClean="0">
-                <a:latin typeface="나눔고딕코딩" panose="020D0009000000000000" pitchFamily="49" charset="-127"/>
-                <a:ea typeface="나눔고딕코딩" panose="020D0009000000000000" pitchFamily="49" charset="-127"/>
-              </a:rPr>
-              <a:t>    </a:t>
-            </a:r>
-            <a:r>
-              <a:rPr lang="ko-KR" altLang="en-US" dirty="0" err="1" smtClean="0">
-                <a:latin typeface="나눔고딕코딩" panose="020D0009000000000000" pitchFamily="49" charset="-127"/>
-                <a:ea typeface="나눔고딕코딩" panose="020D0009000000000000" pitchFamily="49" charset="-127"/>
-              </a:rPr>
-              <a:t>person.lastName.eq</a:t>
-            </a:r>
-            <a:r>
-              <a:rPr lang="ko-KR" altLang="en-US" dirty="0" smtClean="0">
-                <a:latin typeface="나눔고딕코딩" panose="020D0009000000000000" pitchFamily="49" charset="-127"/>
-                <a:ea typeface="나눔고딕코딩" panose="020D0009000000000000" pitchFamily="49" charset="-127"/>
-              </a:rPr>
-              <a:t>("</a:t>
-            </a:r>
-            <a:r>
-              <a:rPr lang="ko-KR" altLang="en-US" dirty="0" err="1" smtClean="0">
-                <a:latin typeface="나눔고딕코딩" panose="020D0009000000000000" pitchFamily="49" charset="-127"/>
-                <a:ea typeface="나눔고딕코딩" panose="020D0009000000000000" pitchFamily="49" charset="-127"/>
-              </a:rPr>
-              <a:t>Doe</a:t>
-            </a:r>
-            <a:r>
-              <a:rPr lang="ko-KR" altLang="en-US" dirty="0" smtClean="0">
-                <a:latin typeface="나눔고딕코딩" panose="020D0009000000000000" pitchFamily="49" charset="-127"/>
-                <a:ea typeface="나눔고딕코딩" panose="020D0009000000000000" pitchFamily="49" charset="-127"/>
-              </a:rPr>
-              <a:t>"))</a:t>
-            </a:r>
-          </a:p>
-          <a:p>
-            <a:r>
-              <a:rPr lang="ko-KR" altLang="en-US" dirty="0" smtClean="0">
-                <a:latin typeface="나눔고딕코딩" panose="020D0009000000000000" pitchFamily="49" charset="-127"/>
-                <a:ea typeface="나눔고딕코딩" panose="020D0009000000000000" pitchFamily="49" charset="-127"/>
-              </a:rPr>
-              <a:t>  .</a:t>
-            </a:r>
-            <a:r>
-              <a:rPr lang="ko-KR" altLang="en-US" dirty="0" err="1" smtClean="0">
-                <a:latin typeface="나눔고딕코딩" panose="020D0009000000000000" pitchFamily="49" charset="-127"/>
-                <a:ea typeface="나눔고딕코딩" panose="020D0009000000000000" pitchFamily="49" charset="-127"/>
-              </a:rPr>
-              <a:t>fetch</a:t>
-            </a:r>
-            <a:r>
-              <a:rPr lang="ko-KR" altLang="en-US" dirty="0" smtClean="0">
-                <a:latin typeface="나눔고딕코딩" panose="020D0009000000000000" pitchFamily="49" charset="-127"/>
-                <a:ea typeface="나눔고딕코딩" panose="020D0009000000000000" pitchFamily="49" charset="-127"/>
-              </a:rPr>
-              <a:t>();</a:t>
-            </a:r>
-            <a:endParaRPr lang="ko-KR" altLang="en-US" dirty="0">
-              <a:latin typeface="나눔고딕코딩" panose="020D0009000000000000" pitchFamily="49" charset="-127"/>
-              <a:ea typeface="나눔고딕코딩" panose="020D0009000000000000" pitchFamily="49" charset="-127"/>
-            </a:endParaRPr>
-          </a:p>
-        </p:txBody>
-      </p:sp>
-      <p:sp>
-        <p:nvSpPr>
-          <p:cNvPr id="6" name="직사각형 5"/>
-          <p:cNvSpPr/>
-          <p:nvPr/>
-        </p:nvSpPr>
-        <p:spPr>
-          <a:xfrm>
-            <a:off x="5228492" y="3060247"/>
-            <a:ext cx="6096000" cy="1754326"/>
-          </a:xfrm>
-          <a:prstGeom prst="rect">
-            <a:avLst/>
-          </a:prstGeom>
-        </p:spPr>
-        <p:txBody>
-          <a:bodyPr>
-            <a:spAutoFit/>
-          </a:bodyPr>
-          <a:lstStyle/>
-          <a:p>
-            <a:r>
-              <a:rPr lang="ko-KR" altLang="en-US" dirty="0" err="1" smtClean="0"/>
-              <a:t>dsl</a:t>
-            </a:r>
-            <a:r>
-              <a:rPr lang="ko-KR" altLang="en-US" dirty="0" smtClean="0"/>
-              <a:t> .</a:t>
-            </a:r>
-            <a:r>
-              <a:rPr lang="ko-KR" altLang="en-US" dirty="0" err="1" smtClean="0"/>
-              <a:t>select</a:t>
-            </a:r>
-            <a:r>
-              <a:rPr lang="ko-KR" altLang="en-US" dirty="0" smtClean="0"/>
-              <a:t>(CONTENT.IDX, CONTENT.BODY, </a:t>
-            </a:r>
-            <a:r>
-              <a:rPr lang="ko-KR" altLang="en-US" dirty="0" err="1" smtClean="0"/>
-              <a:t>CATEGORY.IDX.as</a:t>
-            </a:r>
-            <a:r>
-              <a:rPr lang="ko-KR" altLang="en-US" dirty="0" smtClean="0"/>
-              <a:t>("</a:t>
-            </a:r>
-            <a:r>
-              <a:rPr lang="ko-KR" altLang="en-US" dirty="0" err="1" smtClean="0"/>
-              <a:t>categoryIdx</a:t>
-            </a:r>
-            <a:r>
-              <a:rPr lang="ko-KR" altLang="en-US" dirty="0" smtClean="0"/>
-              <a:t>"), </a:t>
-            </a:r>
-            <a:r>
-              <a:rPr lang="ko-KR" altLang="en-US" dirty="0" err="1" smtClean="0"/>
-              <a:t>CATEGORY.NAME.as</a:t>
-            </a:r>
-            <a:r>
-              <a:rPr lang="ko-KR" altLang="en-US" dirty="0" smtClean="0"/>
-              <a:t>("</a:t>
-            </a:r>
-            <a:r>
-              <a:rPr lang="ko-KR" altLang="en-US" dirty="0" err="1" smtClean="0"/>
-              <a:t>categoryName</a:t>
-            </a:r>
-            <a:r>
-              <a:rPr lang="ko-KR" altLang="en-US" dirty="0" smtClean="0"/>
-              <a:t>")) .</a:t>
-            </a:r>
-            <a:r>
-              <a:rPr lang="ko-KR" altLang="en-US" dirty="0" err="1" smtClean="0"/>
-              <a:t>from</a:t>
-            </a:r>
-            <a:r>
-              <a:rPr lang="ko-KR" altLang="en-US" dirty="0" smtClean="0"/>
-              <a:t>(CONTENT) .</a:t>
-            </a:r>
-            <a:r>
-              <a:rPr lang="ko-KR" altLang="en-US" dirty="0" err="1" smtClean="0"/>
-              <a:t>join</a:t>
-            </a:r>
-            <a:r>
-              <a:rPr lang="ko-KR" altLang="en-US" dirty="0" smtClean="0"/>
-              <a:t>(CATEGORY).</a:t>
-            </a:r>
-            <a:r>
-              <a:rPr lang="ko-KR" altLang="en-US" dirty="0" err="1" smtClean="0"/>
-              <a:t>on</a:t>
-            </a:r>
-            <a:r>
-              <a:rPr lang="ko-KR" altLang="en-US" dirty="0" smtClean="0"/>
-              <a:t>(</a:t>
-            </a:r>
-            <a:r>
-              <a:rPr lang="ko-KR" altLang="en-US" dirty="0" err="1" smtClean="0"/>
-              <a:t>CATEGORY.IDX.eq</a:t>
-            </a:r>
-            <a:r>
-              <a:rPr lang="ko-KR" altLang="en-US" dirty="0" smtClean="0"/>
-              <a:t>(CONTENT.CATEGORY_IDX)) .</a:t>
-            </a:r>
-            <a:r>
-              <a:rPr lang="ko-KR" altLang="en-US" dirty="0" err="1" smtClean="0"/>
-              <a:t>offset</a:t>
-            </a:r>
-            <a:r>
-              <a:rPr lang="ko-KR" altLang="en-US" dirty="0" smtClean="0"/>
-              <a:t>(</a:t>
-            </a:r>
-            <a:r>
-              <a:rPr lang="ko-KR" altLang="en-US" dirty="0" err="1" smtClean="0"/>
-              <a:t>offset</a:t>
-            </a:r>
-            <a:r>
-              <a:rPr lang="ko-KR" altLang="en-US" dirty="0" smtClean="0"/>
-              <a:t>) .</a:t>
-            </a:r>
-            <a:r>
-              <a:rPr lang="ko-KR" altLang="en-US" dirty="0" err="1" smtClean="0"/>
-              <a:t>limit</a:t>
-            </a:r>
-            <a:r>
-              <a:rPr lang="ko-KR" altLang="en-US" dirty="0" smtClean="0"/>
-              <a:t>(</a:t>
-            </a:r>
-            <a:r>
-              <a:rPr lang="ko-KR" altLang="en-US" dirty="0" err="1" smtClean="0"/>
-              <a:t>limit</a:t>
-            </a:r>
-            <a:r>
-              <a:rPr lang="ko-KR" altLang="en-US" dirty="0" smtClean="0"/>
-              <a:t>) .</a:t>
-            </a:r>
-            <a:r>
-              <a:rPr lang="ko-KR" altLang="en-US" dirty="0" err="1" smtClean="0"/>
-              <a:t>fetch</a:t>
-            </a:r>
-            <a:r>
-              <a:rPr lang="ko-KR" altLang="en-US" dirty="0" smtClean="0"/>
-              <a:t>() .</a:t>
-            </a:r>
-            <a:r>
-              <a:rPr lang="ko-KR" altLang="en-US" dirty="0" err="1" smtClean="0"/>
-              <a:t>into</a:t>
-            </a:r>
-            <a:r>
-              <a:rPr lang="ko-KR" altLang="en-US" dirty="0" smtClean="0"/>
-              <a:t>(</a:t>
-            </a:r>
-            <a:r>
-              <a:rPr lang="ko-KR" altLang="en-US" dirty="0" err="1" smtClean="0"/>
-              <a:t>ContentDetailResponse.class</a:t>
-            </a:r>
-            <a:r>
-              <a:rPr lang="ko-KR" altLang="en-US" dirty="0" smtClean="0"/>
-              <a:t>);</a:t>
             </a:r>
             <a:endParaRPr lang="ko-KR" altLang="en-US" dirty="0"/>
           </a:p>

</xml_diff>